<commit_message>
Correcting PP to reflect workplace
</commit_message>
<xml_diff>
--- a/01_APIs_For_Fun_And_Profit/APIs for fun and profit.pptx
+++ b/01_APIs_For_Fun_And_Profit/APIs for fun and profit.pptx
@@ -111,6 +111,9 @@
   <p:extLst>
     <p:ext uri="{EFAFB233-063F-42B5-8137-9DF3F51BA10A}">
       <p15:sldGuideLst xmlns:p15="http://schemas.microsoft.com/office/powerpoint/2012/main"/>
+    </p:ext>
+    <p:ext uri="{2D200454-40CA-4A62-9FC3-DE9A4176ACB9}">
+      <p15:notesGuideLst xmlns:p15="http://schemas.microsoft.com/office/powerpoint/2012/main"/>
     </p:ext>
   </p:extLst>
 </p:presentation>
@@ -3784,7 +3787,15 @@
           <a:p>
             <a:r>
               <a:rPr lang="en-US" dirty="0"/>
-              <a:t>Stuart graduated from Coding Dojo in October 2021 and is now a software engineer at Sandbox Engineering! He primarily likes to spend his time with his family: a beautiful wife and 5 year old son. He also practices martial arts, loves robots and has had a fan letter to Robert Downey Jr. in draft mode (not sent yet) since 2012.</a:t>
+              <a:t>Stuart graduated from Coding Dojo in October 2021 and is now a software engineer at </a:t>
+            </a:r>
+            <a:r>
+              <a:rPr lang="en-US"/>
+              <a:t>Sandbox Banking! </a:t>
+            </a:r>
+            <a:r>
+              <a:rPr lang="en-US" dirty="0"/>
+              <a:t>He primarily likes to spend his time with his family: a beautiful wife and 5 year old son. He also practices martial arts, loves robots and has had a fan letter to Robert Downey Jr. in draft mode (not sent yet) since 2012.</a:t>
             </a:r>
           </a:p>
         </p:txBody>
@@ -8801,21 +8812,21 @@
 </file>
 
 <file path=customXml/item1.xml><?xml version="1.0" encoding="utf-8"?>
+<?mso-contentType ?>
+<FormTemplates xmlns="http://schemas.microsoft.com/sharepoint/v3/contenttype/forms">
+  <Display>DocumentLibraryForm</Display>
+  <Edit>DocumentLibraryForm</Edit>
+  <New>DocumentLibraryForm</New>
+</FormTemplates>
+</file>
+
+<file path=customXml/item2.xml><?xml version="1.0" encoding="utf-8"?>
 <p:properties xmlns:p="http://schemas.microsoft.com/office/2006/metadata/properties" xmlns:xsi="http://www.w3.org/2001/XMLSchema-instance" xmlns:pc="http://schemas.microsoft.com/office/infopath/2007/PartnerControls">
   <documentManagement>
     <Status xmlns="71af3243-3dd4-4a8d-8c0d-dd76da1f02a5">Not started</Status>
     <MediaServiceKeyPoints xmlns="71af3243-3dd4-4a8d-8c0d-dd76da1f02a5" xsi:nil="true"/>
   </documentManagement>
 </p:properties>
-</file>
-
-<file path=customXml/item2.xml><?xml version="1.0" encoding="utf-8"?>
-<?mso-contentType ?>
-<FormTemplates xmlns="http://schemas.microsoft.com/sharepoint/v3/contenttype/forms">
-  <Display>DocumentLibraryForm</Display>
-  <Edit>DocumentLibraryForm</Edit>
-  <New>DocumentLibraryForm</New>
-</FormTemplates>
 </file>
 
 <file path=customXml/item3.xml><?xml version="1.0" encoding="utf-8"?>
@@ -9040,19 +9051,19 @@
 </file>
 
 <file path=customXml/itemProps1.xml><?xml version="1.0" encoding="utf-8"?>
+<ds:datastoreItem xmlns:ds="http://schemas.openxmlformats.org/officeDocument/2006/customXml" ds:itemID="{CDB58277-F8DF-46FF-84EC-EF41B835E69F}">
+  <ds:schemaRefs>
+    <ds:schemaRef ds:uri="http://schemas.microsoft.com/sharepoint/v3/contenttype/forms"/>
+  </ds:schemaRefs>
+</ds:datastoreItem>
+</file>
+
+<file path=customXml/itemProps2.xml><?xml version="1.0" encoding="utf-8"?>
 <ds:datastoreItem xmlns:ds="http://schemas.openxmlformats.org/officeDocument/2006/customXml" ds:itemID="{137651BA-F45C-4845-9AB3-E0A65B39F5E1}">
   <ds:schemaRefs>
     <ds:schemaRef ds:uri="http://schemas.microsoft.com/office/2006/metadata/properties"/>
     <ds:schemaRef ds:uri="http://schemas.microsoft.com/office/infopath/2007/PartnerControls"/>
     <ds:schemaRef ds:uri="71af3243-3dd4-4a8d-8c0d-dd76da1f02a5"/>
-  </ds:schemaRefs>
-</ds:datastoreItem>
-</file>
-
-<file path=customXml/itemProps2.xml><?xml version="1.0" encoding="utf-8"?>
-<ds:datastoreItem xmlns:ds="http://schemas.openxmlformats.org/officeDocument/2006/customXml" ds:itemID="{CDB58277-F8DF-46FF-84EC-EF41B835E69F}">
-  <ds:schemaRefs>
-    <ds:schemaRef ds:uri="http://schemas.microsoft.com/sharepoint/v3/contenttype/forms"/>
   </ds:schemaRefs>
 </ds:datastoreItem>
 </file>

</xml_diff>